<commit_message>
Rajout de message de félicitation en fin de partie
</commit_message>
<xml_diff>
--- a/Slide_jeu.pptx
+++ b/Slide_jeu.pptx
@@ -259,7 +259,7 @@
           <a:p>
             <a:fld id="{E02CC68B-3A8E-455F-993E-10AD944B2C54}" type="datetimeFigureOut">
               <a:rPr lang="fr-FR" smtClean="0"/>
-              <a:t>18/03/2024</a:t>
+              <a:t>25/03/2024</a:t>
             </a:fld>
             <a:endParaRPr lang="fr-FR"/>
           </a:p>
@@ -457,7 +457,7 @@
           <a:p>
             <a:fld id="{E02CC68B-3A8E-455F-993E-10AD944B2C54}" type="datetimeFigureOut">
               <a:rPr lang="fr-FR" smtClean="0"/>
-              <a:t>18/03/2024</a:t>
+              <a:t>25/03/2024</a:t>
             </a:fld>
             <a:endParaRPr lang="fr-FR"/>
           </a:p>
@@ -665,7 +665,7 @@
           <a:p>
             <a:fld id="{E02CC68B-3A8E-455F-993E-10AD944B2C54}" type="datetimeFigureOut">
               <a:rPr lang="fr-FR" smtClean="0"/>
-              <a:t>18/03/2024</a:t>
+              <a:t>25/03/2024</a:t>
             </a:fld>
             <a:endParaRPr lang="fr-FR"/>
           </a:p>
@@ -863,7 +863,7 @@
           <a:p>
             <a:fld id="{E02CC68B-3A8E-455F-993E-10AD944B2C54}" type="datetimeFigureOut">
               <a:rPr lang="fr-FR" smtClean="0"/>
-              <a:t>18/03/2024</a:t>
+              <a:t>25/03/2024</a:t>
             </a:fld>
             <a:endParaRPr lang="fr-FR"/>
           </a:p>
@@ -1138,7 +1138,7 @@
           <a:p>
             <a:fld id="{E02CC68B-3A8E-455F-993E-10AD944B2C54}" type="datetimeFigureOut">
               <a:rPr lang="fr-FR" smtClean="0"/>
-              <a:t>18/03/2024</a:t>
+              <a:t>25/03/2024</a:t>
             </a:fld>
             <a:endParaRPr lang="fr-FR"/>
           </a:p>
@@ -1403,7 +1403,7 @@
           <a:p>
             <a:fld id="{E02CC68B-3A8E-455F-993E-10AD944B2C54}" type="datetimeFigureOut">
               <a:rPr lang="fr-FR" smtClean="0"/>
-              <a:t>18/03/2024</a:t>
+              <a:t>25/03/2024</a:t>
             </a:fld>
             <a:endParaRPr lang="fr-FR"/>
           </a:p>
@@ -1815,7 +1815,7 @@
           <a:p>
             <a:fld id="{E02CC68B-3A8E-455F-993E-10AD944B2C54}" type="datetimeFigureOut">
               <a:rPr lang="fr-FR" smtClean="0"/>
-              <a:t>18/03/2024</a:t>
+              <a:t>25/03/2024</a:t>
             </a:fld>
             <a:endParaRPr lang="fr-FR"/>
           </a:p>
@@ -1956,7 +1956,7 @@
           <a:p>
             <a:fld id="{E02CC68B-3A8E-455F-993E-10AD944B2C54}" type="datetimeFigureOut">
               <a:rPr lang="fr-FR" smtClean="0"/>
-              <a:t>18/03/2024</a:t>
+              <a:t>25/03/2024</a:t>
             </a:fld>
             <a:endParaRPr lang="fr-FR"/>
           </a:p>
@@ -2069,7 +2069,7 @@
           <a:p>
             <a:fld id="{E02CC68B-3A8E-455F-993E-10AD944B2C54}" type="datetimeFigureOut">
               <a:rPr lang="fr-FR" smtClean="0"/>
-              <a:t>18/03/2024</a:t>
+              <a:t>25/03/2024</a:t>
             </a:fld>
             <a:endParaRPr lang="fr-FR"/>
           </a:p>
@@ -2380,7 +2380,7 @@
           <a:p>
             <a:fld id="{E02CC68B-3A8E-455F-993E-10AD944B2C54}" type="datetimeFigureOut">
               <a:rPr lang="fr-FR" smtClean="0"/>
-              <a:t>18/03/2024</a:t>
+              <a:t>25/03/2024</a:t>
             </a:fld>
             <a:endParaRPr lang="fr-FR"/>
           </a:p>
@@ -2668,7 +2668,7 @@
           <a:p>
             <a:fld id="{E02CC68B-3A8E-455F-993E-10AD944B2C54}" type="datetimeFigureOut">
               <a:rPr lang="fr-FR" smtClean="0"/>
-              <a:t>18/03/2024</a:t>
+              <a:t>25/03/2024</a:t>
             </a:fld>
             <a:endParaRPr lang="fr-FR"/>
           </a:p>
@@ -2909,7 +2909,7 @@
           <a:p>
             <a:fld id="{E02CC68B-3A8E-455F-993E-10AD944B2C54}" type="datetimeFigureOut">
               <a:rPr lang="fr-FR" smtClean="0"/>
-              <a:t>18/03/2024</a:t>
+              <a:t>25/03/2024</a:t>
             </a:fld>
             <a:endParaRPr lang="fr-FR"/>
           </a:p>
@@ -3412,13 +3412,20 @@
           </a:xfrm>
         </p:spPr>
         <p:txBody>
-          <a:bodyPr/>
-          <a:lstStyle/>
-          <a:p>
-            <a:r>
-              <a:rPr lang="fr-FR" dirty="0"/>
-              <a:t>Titre du jeu: à trouver</a:t>
-            </a:r>
+          <a:bodyPr>
+            <a:normAutofit/>
+          </a:bodyPr>
+          <a:lstStyle/>
+          <a:p>
+            <a:r>
+              <a:rPr lang="fr-FR" sz="3600" dirty="0"/>
+              <a:t>The hard </a:t>
+            </a:r>
+            <a:r>
+              <a:rPr lang="fr-FR" sz="3600" dirty="0" err="1"/>
+              <a:t>disk</a:t>
+            </a:r>
+            <a:endParaRPr lang="fr-FR" sz="3600" dirty="0"/>
           </a:p>
         </p:txBody>
       </p:sp>

</xml_diff>